<commit_message>
Added comments to every file
</commit_message>
<xml_diff>
--- a/Pictures/iCivilization.pptx
+++ b/Pictures/iCivilization.pptx
@@ -219,7 +219,7 @@
           <a:p>
             <a:fld id="{65DD71D7-55AC-46BD-81B3-09AB2F9EFBD8}" type="datetimeFigureOut">
               <a:rPr lang="en-US" smtClean="0"/>
-              <a:t>4/29/2015</a:t>
+              <a:t>4/30/2015</a:t>
             </a:fld>
             <a:endParaRPr lang="en-US"/>
           </a:p>
@@ -384,7 +384,7 @@
           <a:p>
             <a:fld id="{1F89424F-BB59-4F4E-9822-4CA3E770FFD2}" type="datetimeFigureOut">
               <a:rPr lang="en-US" smtClean="0"/>
-              <a:t>4/29/2015</a:t>
+              <a:t>4/30/2015</a:t>
             </a:fld>
             <a:endParaRPr lang="en-US"/>
           </a:p>
@@ -4349,11 +4349,11 @@
   <p:clrMapOvr>
     <a:masterClrMapping/>
   </p:clrMapOvr>
-  <mc:AlternateContent xmlns:mc="http://schemas.openxmlformats.org/markup-compatibility/2006">
-    <mc:Choice xmlns:p14="http://schemas.microsoft.com/office/powerpoint/2010/main" Requires="p14">
+  <mc:AlternateContent xmlns:mc="http://schemas.openxmlformats.org/markup-compatibility/2006" xmlns:p14="http://schemas.microsoft.com/office/powerpoint/2010/main">
+    <mc:Choice Requires="p14">
       <p:transition p14:dur="0"/>
     </mc:Choice>
-    <mc:Fallback>
+    <mc:Fallback xmlns="">
       <p:transition/>
     </mc:Fallback>
   </mc:AlternateContent>
@@ -4473,11 +4473,11 @@
   <p:clrMapOvr>
     <a:masterClrMapping/>
   </p:clrMapOvr>
-  <mc:AlternateContent xmlns:mc="http://schemas.openxmlformats.org/markup-compatibility/2006">
-    <mc:Choice xmlns:p14="http://schemas.microsoft.com/office/powerpoint/2010/main" Requires="p14">
+  <mc:AlternateContent xmlns:mc="http://schemas.openxmlformats.org/markup-compatibility/2006" xmlns:p14="http://schemas.microsoft.com/office/powerpoint/2010/main">
+    <mc:Choice Requires="p14">
       <p:transition p14:dur="0"/>
     </mc:Choice>
-    <mc:Fallback>
+    <mc:Fallback xmlns="">
       <p:transition/>
     </mc:Fallback>
   </mc:AlternateContent>
@@ -4594,11 +4594,11 @@
   <p:clrMapOvr>
     <a:masterClrMapping/>
   </p:clrMapOvr>
-  <mc:AlternateContent xmlns:mc="http://schemas.openxmlformats.org/markup-compatibility/2006">
-    <mc:Choice xmlns:p14="http://schemas.microsoft.com/office/powerpoint/2010/main" Requires="p14">
+  <mc:AlternateContent xmlns:mc="http://schemas.openxmlformats.org/markup-compatibility/2006" xmlns:p14="http://schemas.microsoft.com/office/powerpoint/2010/main">
+    <mc:Choice Requires="p14">
       <p:transition p14:dur="0"/>
     </mc:Choice>
-    <mc:Fallback>
+    <mc:Fallback xmlns="">
       <p:transition/>
     </mc:Fallback>
   </mc:AlternateContent>
@@ -4716,11 +4716,11 @@
   <p:clrMapOvr>
     <a:masterClrMapping/>
   </p:clrMapOvr>
-  <mc:AlternateContent xmlns:mc="http://schemas.openxmlformats.org/markup-compatibility/2006">
-    <mc:Choice xmlns:p14="http://schemas.microsoft.com/office/powerpoint/2010/main" Requires="p14">
+  <mc:AlternateContent xmlns:mc="http://schemas.openxmlformats.org/markup-compatibility/2006" xmlns:p14="http://schemas.microsoft.com/office/powerpoint/2010/main">
+    <mc:Choice Requires="p14">
       <p:transition p14:dur="0"/>
     </mc:Choice>
-    <mc:Fallback>
+    <mc:Fallback xmlns="">
       <p:transition/>
     </mc:Fallback>
   </mc:AlternateContent>
@@ -4835,11 +4835,11 @@
   <p:clrMapOvr>
     <a:masterClrMapping/>
   </p:clrMapOvr>
-  <mc:AlternateContent xmlns:mc="http://schemas.openxmlformats.org/markup-compatibility/2006">
-    <mc:Choice xmlns:p14="http://schemas.microsoft.com/office/powerpoint/2010/main" Requires="p14">
+  <mc:AlternateContent xmlns:mc="http://schemas.openxmlformats.org/markup-compatibility/2006" xmlns:p14="http://schemas.microsoft.com/office/powerpoint/2010/main">
+    <mc:Choice Requires="p14">
       <p:transition p14:dur="0"/>
     </mc:Choice>
-    <mc:Fallback>
+    <mc:Fallback xmlns="">
       <p:transition/>
     </mc:Fallback>
   </mc:AlternateContent>
@@ -4913,24 +4913,25 @@
           <a:lstStyle/>
           <a:p>
             <a:r>
+              <a:rPr lang="en-US" sz="3200" dirty="0"/>
+              <a:t>Re-Learning C++</a:t>
+            </a:r>
+          </a:p>
+          <a:p>
+            <a:endParaRPr lang="en-US" dirty="0" smtClean="0"/>
+          </a:p>
+          <a:p>
+            <a:endParaRPr lang="en-US" dirty="0"/>
+          </a:p>
+          <a:p>
+            <a:r>
               <a:rPr lang="en-US" sz="3200" dirty="0" smtClean="0"/>
-              <a:t>Not Many</a:t>
-            </a:r>
-          </a:p>
-          <a:p>
-            <a:endParaRPr lang="en-US" dirty="0" smtClean="0"/>
-          </a:p>
-          <a:p>
-            <a:endParaRPr lang="en-US" dirty="0"/>
-          </a:p>
-          <a:p>
-            <a:r>
-              <a:rPr lang="en-US" sz="3200" dirty="0" smtClean="0"/>
-              <a:t>Re-Learning C++</a:t>
-            </a:r>
-          </a:p>
-          <a:p>
-            <a:endParaRPr lang="en-US" dirty="0" smtClean="0"/>
+              <a:t>Modeling Objects</a:t>
+            </a:r>
+            <a:endParaRPr lang="en-US" sz="3200" dirty="0" smtClean="0"/>
+          </a:p>
+          <a:p>
+            <a:endParaRPr lang="en-US" smtClean="0"/>
           </a:p>
           <a:p>
             <a:endParaRPr lang="en-US" dirty="0"/>
@@ -4953,11 +4954,11 @@
   <p:clrMapOvr>
     <a:masterClrMapping/>
   </p:clrMapOvr>
-  <mc:AlternateContent xmlns:mc="http://schemas.openxmlformats.org/markup-compatibility/2006">
-    <mc:Choice xmlns:p14="http://schemas.microsoft.com/office/powerpoint/2010/main" Requires="p14">
+  <mc:AlternateContent xmlns:mc="http://schemas.openxmlformats.org/markup-compatibility/2006" xmlns:p14="http://schemas.microsoft.com/office/powerpoint/2010/main">
+    <mc:Choice Requires="p14">
       <p:transition p14:dur="0"/>
     </mc:Choice>
-    <mc:Fallback>
+    <mc:Fallback xmlns="">
       <p:transition/>
     </mc:Fallback>
   </mc:AlternateContent>

</xml_diff>